<commit_message>
fix: KEDA architecture should use 'API Server' instead of 'store'
Signed-off-by: Tom Kerkhove <kerkhove.tom@gmail.com>
</commit_message>
<xml_diff>
--- a/images/keda-architecture.pptx
+++ b/images/keda-architecture.pptx
@@ -259,7 +259,7 @@
           <a:p>
             <a:fld id="{B1FD6104-F9B7-48F9-9D06-3B68CBE66B8A}" type="datetimeFigureOut">
               <a:rPr lang="en-US" smtClean="0"/>
-              <a:t>1/18/2021</a:t>
+              <a:t>1/21/2021</a:t>
             </a:fld>
             <a:endParaRPr lang="en-US"/>
           </a:p>
@@ -457,7 +457,7 @@
           <a:p>
             <a:fld id="{B1FD6104-F9B7-48F9-9D06-3B68CBE66B8A}" type="datetimeFigureOut">
               <a:rPr lang="en-US" smtClean="0"/>
-              <a:t>1/18/2021</a:t>
+              <a:t>1/21/2021</a:t>
             </a:fld>
             <a:endParaRPr lang="en-US"/>
           </a:p>
@@ -665,7 +665,7 @@
           <a:p>
             <a:fld id="{B1FD6104-F9B7-48F9-9D06-3B68CBE66B8A}" type="datetimeFigureOut">
               <a:rPr lang="en-US" smtClean="0"/>
-              <a:t>1/18/2021</a:t>
+              <a:t>1/21/2021</a:t>
             </a:fld>
             <a:endParaRPr lang="en-US"/>
           </a:p>
@@ -1040,7 +1040,7 @@
           <a:p>
             <a:fld id="{B1FD6104-F9B7-48F9-9D06-3B68CBE66B8A}" type="datetimeFigureOut">
               <a:rPr lang="en-US" smtClean="0"/>
-              <a:t>1/18/2021</a:t>
+              <a:t>1/21/2021</a:t>
             </a:fld>
             <a:endParaRPr lang="en-US"/>
           </a:p>
@@ -1315,7 +1315,7 @@
           <a:p>
             <a:fld id="{B1FD6104-F9B7-48F9-9D06-3B68CBE66B8A}" type="datetimeFigureOut">
               <a:rPr lang="en-US" smtClean="0"/>
-              <a:t>1/18/2021</a:t>
+              <a:t>1/21/2021</a:t>
             </a:fld>
             <a:endParaRPr lang="en-US"/>
           </a:p>
@@ -1580,7 +1580,7 @@
           <a:p>
             <a:fld id="{B1FD6104-F9B7-48F9-9D06-3B68CBE66B8A}" type="datetimeFigureOut">
               <a:rPr lang="en-US" smtClean="0"/>
-              <a:t>1/18/2021</a:t>
+              <a:t>1/21/2021</a:t>
             </a:fld>
             <a:endParaRPr lang="en-US"/>
           </a:p>
@@ -1992,7 +1992,7 @@
           <a:p>
             <a:fld id="{B1FD6104-F9B7-48F9-9D06-3B68CBE66B8A}" type="datetimeFigureOut">
               <a:rPr lang="en-US" smtClean="0"/>
-              <a:t>1/18/2021</a:t>
+              <a:t>1/21/2021</a:t>
             </a:fld>
             <a:endParaRPr lang="en-US"/>
           </a:p>
@@ -2133,7 +2133,7 @@
           <a:p>
             <a:fld id="{B1FD6104-F9B7-48F9-9D06-3B68CBE66B8A}" type="datetimeFigureOut">
               <a:rPr lang="en-US" smtClean="0"/>
-              <a:t>1/18/2021</a:t>
+              <a:t>1/21/2021</a:t>
             </a:fld>
             <a:endParaRPr lang="en-US"/>
           </a:p>
@@ -2246,7 +2246,7 @@
           <a:p>
             <a:fld id="{B1FD6104-F9B7-48F9-9D06-3B68CBE66B8A}" type="datetimeFigureOut">
               <a:rPr lang="en-US" smtClean="0"/>
-              <a:t>1/18/2021</a:t>
+              <a:t>1/21/2021</a:t>
             </a:fld>
             <a:endParaRPr lang="en-US"/>
           </a:p>
@@ -2557,7 +2557,7 @@
           <a:p>
             <a:fld id="{B1FD6104-F9B7-48F9-9D06-3B68CBE66B8A}" type="datetimeFigureOut">
               <a:rPr lang="en-US" smtClean="0"/>
-              <a:t>1/18/2021</a:t>
+              <a:t>1/21/2021</a:t>
             </a:fld>
             <a:endParaRPr lang="en-US"/>
           </a:p>
@@ -2845,7 +2845,7 @@
           <a:p>
             <a:fld id="{B1FD6104-F9B7-48F9-9D06-3B68CBE66B8A}" type="datetimeFigureOut">
               <a:rPr lang="en-US" smtClean="0"/>
-              <a:t>1/18/2021</a:t>
+              <a:t>1/21/2021</a:t>
             </a:fld>
             <a:endParaRPr lang="en-US"/>
           </a:p>
@@ -3086,7 +3086,7 @@
           <a:p>
             <a:fld id="{B1FD6104-F9B7-48F9-9D06-3B68CBE66B8A}" type="datetimeFigureOut">
               <a:rPr lang="en-US" smtClean="0"/>
-              <a:t>1/18/2021</a:t>
+              <a:t>1/21/2021</a:t>
             </a:fld>
             <a:endParaRPr lang="en-US"/>
           </a:p>
@@ -4304,7 +4304,32 @@
                 <a:latin typeface="Segoe UI Semibold" panose="020B0702040204020203" pitchFamily="34" charset="0"/>
                 <a:cs typeface="Segoe UI Semibold" panose="020B0702040204020203" pitchFamily="34" charset="0"/>
               </a:rPr>
-              <a:t>Kubernetes store</a:t>
+              <a:t>Kubernetes</a:t>
+            </a:r>
+            <a:br>
+              <a:rPr lang="en-US" sz="1176" dirty="0">
+                <a:ln w="3175">
+                  <a:noFill/>
+                </a:ln>
+                <a:solidFill>
+                  <a:srgbClr val="000000"/>
+                </a:solidFill>
+                <a:latin typeface="Segoe UI Semibold" panose="020B0702040204020203" pitchFamily="34" charset="0"/>
+                <a:cs typeface="Segoe UI Semibold" panose="020B0702040204020203" pitchFamily="34" charset="0"/>
+              </a:rPr>
+            </a:br>
+            <a:r>
+              <a:rPr lang="en-US" sz="1176" dirty="0">
+                <a:ln w="3175">
+                  <a:noFill/>
+                </a:ln>
+                <a:solidFill>
+                  <a:srgbClr val="000000"/>
+                </a:solidFill>
+                <a:latin typeface="Segoe UI Semibold" panose="020B0702040204020203" pitchFamily="34" charset="0"/>
+                <a:cs typeface="Segoe UI Semibold" panose="020B0702040204020203" pitchFamily="34" charset="0"/>
+              </a:rPr>
+              <a:t>API Server</a:t>
             </a:r>
           </a:p>
         </p:txBody>

</xml_diff>

<commit_message>
fix: KEDA architecture should use 'API Server' instead of 'store' (#1520)
Signed-off-by: Tom Kerkhove <kerkhove.tom@gmail.com>
</commit_message>
<xml_diff>
--- a/images/keda-architecture.pptx
+++ b/images/keda-architecture.pptx
@@ -259,7 +259,7 @@
           <a:p>
             <a:fld id="{B1FD6104-F9B7-48F9-9D06-3B68CBE66B8A}" type="datetimeFigureOut">
               <a:rPr lang="en-US" smtClean="0"/>
-              <a:t>1/18/2021</a:t>
+              <a:t>1/21/2021</a:t>
             </a:fld>
             <a:endParaRPr lang="en-US"/>
           </a:p>
@@ -457,7 +457,7 @@
           <a:p>
             <a:fld id="{B1FD6104-F9B7-48F9-9D06-3B68CBE66B8A}" type="datetimeFigureOut">
               <a:rPr lang="en-US" smtClean="0"/>
-              <a:t>1/18/2021</a:t>
+              <a:t>1/21/2021</a:t>
             </a:fld>
             <a:endParaRPr lang="en-US"/>
           </a:p>
@@ -665,7 +665,7 @@
           <a:p>
             <a:fld id="{B1FD6104-F9B7-48F9-9D06-3B68CBE66B8A}" type="datetimeFigureOut">
               <a:rPr lang="en-US" smtClean="0"/>
-              <a:t>1/18/2021</a:t>
+              <a:t>1/21/2021</a:t>
             </a:fld>
             <a:endParaRPr lang="en-US"/>
           </a:p>
@@ -1040,7 +1040,7 @@
           <a:p>
             <a:fld id="{B1FD6104-F9B7-48F9-9D06-3B68CBE66B8A}" type="datetimeFigureOut">
               <a:rPr lang="en-US" smtClean="0"/>
-              <a:t>1/18/2021</a:t>
+              <a:t>1/21/2021</a:t>
             </a:fld>
             <a:endParaRPr lang="en-US"/>
           </a:p>
@@ -1315,7 +1315,7 @@
           <a:p>
             <a:fld id="{B1FD6104-F9B7-48F9-9D06-3B68CBE66B8A}" type="datetimeFigureOut">
               <a:rPr lang="en-US" smtClean="0"/>
-              <a:t>1/18/2021</a:t>
+              <a:t>1/21/2021</a:t>
             </a:fld>
             <a:endParaRPr lang="en-US"/>
           </a:p>
@@ -1580,7 +1580,7 @@
           <a:p>
             <a:fld id="{B1FD6104-F9B7-48F9-9D06-3B68CBE66B8A}" type="datetimeFigureOut">
               <a:rPr lang="en-US" smtClean="0"/>
-              <a:t>1/18/2021</a:t>
+              <a:t>1/21/2021</a:t>
             </a:fld>
             <a:endParaRPr lang="en-US"/>
           </a:p>
@@ -1992,7 +1992,7 @@
           <a:p>
             <a:fld id="{B1FD6104-F9B7-48F9-9D06-3B68CBE66B8A}" type="datetimeFigureOut">
               <a:rPr lang="en-US" smtClean="0"/>
-              <a:t>1/18/2021</a:t>
+              <a:t>1/21/2021</a:t>
             </a:fld>
             <a:endParaRPr lang="en-US"/>
           </a:p>
@@ -2133,7 +2133,7 @@
           <a:p>
             <a:fld id="{B1FD6104-F9B7-48F9-9D06-3B68CBE66B8A}" type="datetimeFigureOut">
               <a:rPr lang="en-US" smtClean="0"/>
-              <a:t>1/18/2021</a:t>
+              <a:t>1/21/2021</a:t>
             </a:fld>
             <a:endParaRPr lang="en-US"/>
           </a:p>
@@ -2246,7 +2246,7 @@
           <a:p>
             <a:fld id="{B1FD6104-F9B7-48F9-9D06-3B68CBE66B8A}" type="datetimeFigureOut">
               <a:rPr lang="en-US" smtClean="0"/>
-              <a:t>1/18/2021</a:t>
+              <a:t>1/21/2021</a:t>
             </a:fld>
             <a:endParaRPr lang="en-US"/>
           </a:p>
@@ -2557,7 +2557,7 @@
           <a:p>
             <a:fld id="{B1FD6104-F9B7-48F9-9D06-3B68CBE66B8A}" type="datetimeFigureOut">
               <a:rPr lang="en-US" smtClean="0"/>
-              <a:t>1/18/2021</a:t>
+              <a:t>1/21/2021</a:t>
             </a:fld>
             <a:endParaRPr lang="en-US"/>
           </a:p>
@@ -2845,7 +2845,7 @@
           <a:p>
             <a:fld id="{B1FD6104-F9B7-48F9-9D06-3B68CBE66B8A}" type="datetimeFigureOut">
               <a:rPr lang="en-US" smtClean="0"/>
-              <a:t>1/18/2021</a:t>
+              <a:t>1/21/2021</a:t>
             </a:fld>
             <a:endParaRPr lang="en-US"/>
           </a:p>
@@ -3086,7 +3086,7 @@
           <a:p>
             <a:fld id="{B1FD6104-F9B7-48F9-9D06-3B68CBE66B8A}" type="datetimeFigureOut">
               <a:rPr lang="en-US" smtClean="0"/>
-              <a:t>1/18/2021</a:t>
+              <a:t>1/21/2021</a:t>
             </a:fld>
             <a:endParaRPr lang="en-US"/>
           </a:p>
@@ -4304,7 +4304,32 @@
                 <a:latin typeface="Segoe UI Semibold" panose="020B0702040204020203" pitchFamily="34" charset="0"/>
                 <a:cs typeface="Segoe UI Semibold" panose="020B0702040204020203" pitchFamily="34" charset="0"/>
               </a:rPr>
-              <a:t>Kubernetes store</a:t>
+              <a:t>Kubernetes</a:t>
+            </a:r>
+            <a:br>
+              <a:rPr lang="en-US" sz="1176" dirty="0">
+                <a:ln w="3175">
+                  <a:noFill/>
+                </a:ln>
+                <a:solidFill>
+                  <a:srgbClr val="000000"/>
+                </a:solidFill>
+                <a:latin typeface="Segoe UI Semibold" panose="020B0702040204020203" pitchFamily="34" charset="0"/>
+                <a:cs typeface="Segoe UI Semibold" panose="020B0702040204020203" pitchFamily="34" charset="0"/>
+              </a:rPr>
+            </a:br>
+            <a:r>
+              <a:rPr lang="en-US" sz="1176" dirty="0">
+                <a:ln w="3175">
+                  <a:noFill/>
+                </a:ln>
+                <a:solidFill>
+                  <a:srgbClr val="000000"/>
+                </a:solidFill>
+                <a:latin typeface="Segoe UI Semibold" panose="020B0702040204020203" pitchFamily="34" charset="0"/>
+                <a:cs typeface="Segoe UI Semibold" panose="020B0702040204020203" pitchFamily="34" charset="0"/>
+              </a:rPr>
+              <a:t>API Server</a:t>
             </a:r>
           </a:p>
         </p:txBody>

</xml_diff>